<commit_message>
Update doc images and masters
</commit_message>
<xml_diff>
--- a/doc/masters/tools.pptx
+++ b/doc/masters/tools.pptx
@@ -288,7 +288,7 @@
           <a:p>
             <a:fld id="{0A51A7E1-A367-7348-A8C8-AF221204102D}" type="datetimeFigureOut">
               <a:rPr lang="en-US" smtClean="0"/>
-              <a:t>12/17/11</a:t>
+              <a:t>5/30/12</a:t>
             </a:fld>
             <a:endParaRPr lang="en-US"/>
           </a:p>
@@ -458,7 +458,7 @@
           <a:p>
             <a:fld id="{0A51A7E1-A367-7348-A8C8-AF221204102D}" type="datetimeFigureOut">
               <a:rPr lang="en-US" smtClean="0"/>
-              <a:t>12/17/11</a:t>
+              <a:t>5/30/12</a:t>
             </a:fld>
             <a:endParaRPr lang="en-US"/>
           </a:p>
@@ -638,7 +638,7 @@
           <a:p>
             <a:fld id="{0A51A7E1-A367-7348-A8C8-AF221204102D}" type="datetimeFigureOut">
               <a:rPr lang="en-US" smtClean="0"/>
-              <a:t>12/17/11</a:t>
+              <a:t>5/30/12</a:t>
             </a:fld>
             <a:endParaRPr lang="en-US"/>
           </a:p>
@@ -808,7 +808,7 @@
           <a:p>
             <a:fld id="{0A51A7E1-A367-7348-A8C8-AF221204102D}" type="datetimeFigureOut">
               <a:rPr lang="en-US" smtClean="0"/>
-              <a:t>12/17/11</a:t>
+              <a:t>5/30/12</a:t>
             </a:fld>
             <a:endParaRPr lang="en-US"/>
           </a:p>
@@ -1054,7 +1054,7 @@
           <a:p>
             <a:fld id="{0A51A7E1-A367-7348-A8C8-AF221204102D}" type="datetimeFigureOut">
               <a:rPr lang="en-US" smtClean="0"/>
-              <a:t>12/17/11</a:t>
+              <a:t>5/30/12</a:t>
             </a:fld>
             <a:endParaRPr lang="en-US"/>
           </a:p>
@@ -1342,7 +1342,7 @@
           <a:p>
             <a:fld id="{0A51A7E1-A367-7348-A8C8-AF221204102D}" type="datetimeFigureOut">
               <a:rPr lang="en-US" smtClean="0"/>
-              <a:t>12/17/11</a:t>
+              <a:t>5/30/12</a:t>
             </a:fld>
             <a:endParaRPr lang="en-US"/>
           </a:p>
@@ -1764,7 +1764,7 @@
           <a:p>
             <a:fld id="{0A51A7E1-A367-7348-A8C8-AF221204102D}" type="datetimeFigureOut">
               <a:rPr lang="en-US" smtClean="0"/>
-              <a:t>12/17/11</a:t>
+              <a:t>5/30/12</a:t>
             </a:fld>
             <a:endParaRPr lang="en-US"/>
           </a:p>
@@ -1882,7 +1882,7 @@
           <a:p>
             <a:fld id="{0A51A7E1-A367-7348-A8C8-AF221204102D}" type="datetimeFigureOut">
               <a:rPr lang="en-US" smtClean="0"/>
-              <a:t>12/17/11</a:t>
+              <a:t>5/30/12</a:t>
             </a:fld>
             <a:endParaRPr lang="en-US"/>
           </a:p>
@@ -1977,7 +1977,7 @@
           <a:p>
             <a:fld id="{0A51A7E1-A367-7348-A8C8-AF221204102D}" type="datetimeFigureOut">
               <a:rPr lang="en-US" smtClean="0"/>
-              <a:t>12/17/11</a:t>
+              <a:t>5/30/12</a:t>
             </a:fld>
             <a:endParaRPr lang="en-US"/>
           </a:p>
@@ -2254,7 +2254,7 @@
           <a:p>
             <a:fld id="{0A51A7E1-A367-7348-A8C8-AF221204102D}" type="datetimeFigureOut">
               <a:rPr lang="en-US" smtClean="0"/>
-              <a:t>12/17/11</a:t>
+              <a:t>5/30/12</a:t>
             </a:fld>
             <a:endParaRPr lang="en-US"/>
           </a:p>
@@ -2507,7 +2507,7 @@
           <a:p>
             <a:fld id="{0A51A7E1-A367-7348-A8C8-AF221204102D}" type="datetimeFigureOut">
               <a:rPr lang="en-US" smtClean="0"/>
-              <a:t>12/17/11</a:t>
+              <a:t>5/30/12</a:t>
             </a:fld>
             <a:endParaRPr lang="en-US"/>
           </a:p>
@@ -2720,7 +2720,7 @@
           <a:p>
             <a:fld id="{0A51A7E1-A367-7348-A8C8-AF221204102D}" type="datetimeFigureOut">
               <a:rPr lang="en-US" smtClean="0"/>
-              <a:t>12/17/11</a:t>
+              <a:t>5/30/12</a:t>
             </a:fld>
             <a:endParaRPr lang="en-US"/>
           </a:p>
@@ -3266,8 +3266,8 @@
           <a:p>
             <a:pPr algn="ctr"/>
             <a:r>
-              <a:rPr lang="en-US" dirty="0" err="1" smtClean="0"/>
-              <a:t>Ejsc</a:t>
+              <a:rPr lang="en-US" smtClean="0"/>
+              <a:t>ejsc</a:t>
             </a:r>
             <a:r>
               <a:rPr lang="en-US" dirty="0" smtClean="0"/>
@@ -3320,7 +3320,7 @@
             <a:pPr algn="ctr"/>
             <a:r>
               <a:rPr lang="en-US" dirty="0" err="1" smtClean="0"/>
-              <a:t>EJScript</a:t>
+              <a:t>ejs</a:t>
             </a:r>
             <a:r>
               <a:rPr lang="en-US" dirty="0" smtClean="0"/>

</xml_diff>